<commit_message>
sliding windows and fit a polynomial added
</commit_message>
<xml_diff>
--- a/writeup/Pipeline_test_images/Pipeline.pptx
+++ b/writeup/Pipeline_test_images/Pipeline.pptx
@@ -14,6 +14,7 @@
     <p:sldId id="262" r:id="rId8"/>
     <p:sldId id="263" r:id="rId9"/>
     <p:sldId id="264" r:id="rId10"/>
+    <p:sldId id="265" r:id="rId11"/>
   </p:sldIdLst>
   <p:sldSz cx="12192000" cy="6858000"/>
   <p:notesSz cx="6858000" cy="9144000"/>
@@ -112,6 +113,11 @@
       </a:defRPr>
     </a:lvl9pPr>
   </p:defaultTextStyle>
+  <p:extLst>
+    <p:ext uri="{EFAFB233-063F-42B5-8137-9DF3F51BA10A}">
+      <p15:sldGuideLst xmlns:p15="http://schemas.microsoft.com/office/powerpoint/2012/main"/>
+    </p:ext>
+  </p:extLst>
 </p:presentation>
 </file>
 
@@ -3804,6 +3810,255 @@
 </p:sld>
 </file>
 
+<file path=ppt/slides/slide10.xml><?xml version="1.0" encoding="utf-8"?>
+<p:sld xmlns:a="http://schemas.openxmlformats.org/drawingml/2006/main" xmlns:r="http://schemas.openxmlformats.org/officeDocument/2006/relationships" xmlns:p="http://schemas.openxmlformats.org/presentationml/2006/main">
+  <p:cSld>
+    <p:spTree>
+      <p:nvGrpSpPr>
+        <p:cNvPr id="1" name=""/>
+        <p:cNvGrpSpPr/>
+        <p:nvPr/>
+      </p:nvGrpSpPr>
+      <p:grpSpPr>
+        <a:xfrm>
+          <a:off x="0" y="0"/>
+          <a:ext cx="0" cy="0"/>
+          <a:chOff x="0" y="0"/>
+          <a:chExt cx="0" cy="0"/>
+        </a:xfrm>
+      </p:grpSpPr>
+      <p:pic>
+        <p:nvPicPr>
+          <p:cNvPr id="2" name="Grafik 1">
+            <a:extLst>
+              <a:ext uri="{FF2B5EF4-FFF2-40B4-BE49-F238E27FC236}">
+                <a16:creationId xmlns:a16="http://schemas.microsoft.com/office/drawing/2014/main" id="{B122BE60-5698-4CD0-B4D9-570BC093BBC5}"/>
+              </a:ext>
+            </a:extLst>
+          </p:cNvPr>
+          <p:cNvPicPr>
+            <a:picLocks noChangeAspect="1"/>
+          </p:cNvPicPr>
+          <p:nvPr/>
+        </p:nvPicPr>
+        <p:blipFill>
+          <a:blip r:embed="rId2"/>
+          <a:stretch>
+            <a:fillRect/>
+          </a:stretch>
+        </p:blipFill>
+        <p:spPr>
+          <a:xfrm>
+            <a:off x="631078" y="2186800"/>
+            <a:ext cx="3161707" cy="1797341"/>
+          </a:xfrm>
+          <a:prstGeom prst="rect">
+            <a:avLst/>
+          </a:prstGeom>
+        </p:spPr>
+      </p:pic>
+      <p:pic>
+        <p:nvPicPr>
+          <p:cNvPr id="1026" name="Picture 2" descr="https://lh3.googleusercontent.com/9gF0N2oLmtIQAIotoo93nu9fuSarfhf8IG0Lhzlejz-h00EBGpSecIV0namO8x4-0483W2lMcg_KpulaYgI">
+            <a:extLst>
+              <a:ext uri="{FF2B5EF4-FFF2-40B4-BE49-F238E27FC236}">
+                <a16:creationId xmlns:a16="http://schemas.microsoft.com/office/drawing/2014/main" id="{6ABC10CA-61A0-46BA-A563-AF5C6160CE61}"/>
+              </a:ext>
+            </a:extLst>
+          </p:cNvPr>
+          <p:cNvPicPr>
+            <a:picLocks noChangeAspect="1" noChangeArrowheads="1"/>
+          </p:cNvPicPr>
+          <p:nvPr/>
+        </p:nvPicPr>
+        <p:blipFill>
+          <a:blip r:embed="rId3">
+            <a:extLst>
+              <a:ext uri="{28A0092B-C50C-407E-A947-70E740481C1C}">
+                <a14:useLocalDpi xmlns:a14="http://schemas.microsoft.com/office/drawing/2010/main" val="0"/>
+              </a:ext>
+            </a:extLst>
+          </a:blip>
+          <a:srcRect/>
+          <a:stretch>
+            <a:fillRect/>
+          </a:stretch>
+        </p:blipFill>
+        <p:spPr bwMode="auto">
+          <a:xfrm>
+            <a:off x="3885781" y="3822652"/>
+            <a:ext cx="4076304" cy="2292921"/>
+          </a:xfrm>
+          <a:prstGeom prst="rect">
+            <a:avLst/>
+          </a:prstGeom>
+          <a:noFill/>
+          <a:extLst>
+            <a:ext uri="{909E8E84-426E-40DD-AFC4-6F175D3DCCD1}">
+              <a14:hiddenFill xmlns:a14="http://schemas.microsoft.com/office/drawing/2010/main">
+                <a:solidFill>
+                  <a:srgbClr val="FFFFFF"/>
+                </a:solidFill>
+              </a14:hiddenFill>
+            </a:ext>
+          </a:extLst>
+        </p:spPr>
+      </p:pic>
+      <p:pic>
+        <p:nvPicPr>
+          <p:cNvPr id="1028" name="Picture 4" descr="https://video.udacity-data.com/topher/2016/December/58422552_warped-example/warped-example.jpg">
+            <a:extLst>
+              <a:ext uri="{FF2B5EF4-FFF2-40B4-BE49-F238E27FC236}">
+                <a16:creationId xmlns:a16="http://schemas.microsoft.com/office/drawing/2014/main" id="{2CA5C400-E579-47B1-AD3E-4CBE078DC659}"/>
+              </a:ext>
+            </a:extLst>
+          </p:cNvPr>
+          <p:cNvPicPr>
+            <a:picLocks noChangeAspect="1" noChangeArrowheads="1"/>
+          </p:cNvPicPr>
+          <p:nvPr/>
+        </p:nvPicPr>
+        <p:blipFill>
+          <a:blip r:embed="rId4">
+            <a:extLst>
+              <a:ext uri="{28A0092B-C50C-407E-A947-70E740481C1C}">
+                <a14:useLocalDpi xmlns:a14="http://schemas.microsoft.com/office/drawing/2010/main" val="0"/>
+              </a:ext>
+            </a:extLst>
+          </a:blip>
+          <a:srcRect/>
+          <a:stretch>
+            <a:fillRect/>
+          </a:stretch>
+        </p:blipFill>
+        <p:spPr bwMode="auto">
+          <a:xfrm>
+            <a:off x="631078" y="171974"/>
+            <a:ext cx="3064779" cy="1723938"/>
+          </a:xfrm>
+          <a:prstGeom prst="rect">
+            <a:avLst/>
+          </a:prstGeom>
+          <a:noFill/>
+          <a:extLst>
+            <a:ext uri="{909E8E84-426E-40DD-AFC4-6F175D3DCCD1}">
+              <a14:hiddenFill xmlns:a14="http://schemas.microsoft.com/office/drawing/2010/main">
+                <a:solidFill>
+                  <a:srgbClr val="FFFFFF"/>
+                </a:solidFill>
+              </a14:hiddenFill>
+            </a:ext>
+          </a:extLst>
+        </p:spPr>
+      </p:pic>
+      <p:pic>
+        <p:nvPicPr>
+          <p:cNvPr id="1030" name="Picture 6" descr="https://video.udacity-data.com/topher/2018/June/5b2343e8_screen-shot-2017-01-28-at-11.49.20-am/screen-shot-2017-01-28-at-11.49.20-am.png">
+            <a:extLst>
+              <a:ext uri="{FF2B5EF4-FFF2-40B4-BE49-F238E27FC236}">
+                <a16:creationId xmlns:a16="http://schemas.microsoft.com/office/drawing/2014/main" id="{9C7E4525-E413-49A2-BEA7-AD3E4E0E3C4A}"/>
+              </a:ext>
+            </a:extLst>
+          </p:cNvPr>
+          <p:cNvPicPr>
+            <a:picLocks noChangeAspect="1" noChangeArrowheads="1"/>
+          </p:cNvPicPr>
+          <p:nvPr/>
+        </p:nvPicPr>
+        <p:blipFill>
+          <a:blip r:embed="rId5">
+            <a:extLst>
+              <a:ext uri="{28A0092B-C50C-407E-A947-70E740481C1C}">
+                <a14:useLocalDpi xmlns:a14="http://schemas.microsoft.com/office/drawing/2010/main" val="0"/>
+              </a:ext>
+            </a:extLst>
+          </a:blip>
+          <a:srcRect/>
+          <a:stretch>
+            <a:fillRect/>
+          </a:stretch>
+        </p:blipFill>
+        <p:spPr bwMode="auto">
+          <a:xfrm>
+            <a:off x="327607" y="3984141"/>
+            <a:ext cx="3498734" cy="2072710"/>
+          </a:xfrm>
+          <a:prstGeom prst="rect">
+            <a:avLst/>
+          </a:prstGeom>
+          <a:noFill/>
+          <a:extLst>
+            <a:ext uri="{909E8E84-426E-40DD-AFC4-6F175D3DCCD1}">
+              <a14:hiddenFill xmlns:a14="http://schemas.microsoft.com/office/drawing/2010/main">
+                <a:solidFill>
+                  <a:srgbClr val="FFFFFF"/>
+                </a:solidFill>
+              </a14:hiddenFill>
+            </a:ext>
+          </a:extLst>
+        </p:spPr>
+      </p:pic>
+      <p:sp>
+        <p:nvSpPr>
+          <p:cNvPr id="3" name="Textfeld 2">
+            <a:extLst>
+              <a:ext uri="{FF2B5EF4-FFF2-40B4-BE49-F238E27FC236}">
+                <a16:creationId xmlns:a16="http://schemas.microsoft.com/office/drawing/2014/main" id="{FCA90C65-FB0C-4C76-943A-269F378C93BC}"/>
+              </a:ext>
+            </a:extLst>
+          </p:cNvPr>
+          <p:cNvSpPr txBox="1"/>
+          <p:nvPr/>
+        </p:nvSpPr>
+        <p:spPr>
+          <a:xfrm>
+            <a:off x="4999839" y="6056851"/>
+            <a:ext cx="1191352" cy="261610"/>
+          </a:xfrm>
+          <a:prstGeom prst="rect">
+            <a:avLst/>
+          </a:prstGeom>
+          <a:noFill/>
+        </p:spPr>
+        <p:txBody>
+          <a:bodyPr wrap="none" rtlCol="0">
+            <a:spAutoFit/>
+          </a:bodyPr>
+          <a:lstStyle/>
+          <a:p>
+            <a:r>
+              <a:rPr lang="de-DE" sz="1100" dirty="0"/>
+              <a:t>Search </a:t>
+            </a:r>
+            <a:r>
+              <a:rPr lang="de-DE" sz="1100" dirty="0" err="1"/>
+              <a:t>from</a:t>
+            </a:r>
+            <a:r>
+              <a:rPr lang="de-DE" sz="1100" dirty="0"/>
+              <a:t> </a:t>
+            </a:r>
+            <a:r>
+              <a:rPr lang="de-DE" sz="1100" dirty="0" err="1"/>
+              <a:t>prior</a:t>
+            </a:r>
+            <a:endParaRPr lang="de-DE" sz="1100" dirty="0"/>
+          </a:p>
+        </p:txBody>
+      </p:sp>
+    </p:spTree>
+    <p:extLst>
+      <p:ext uri="{BB962C8B-B14F-4D97-AF65-F5344CB8AC3E}">
+        <p14:creationId xmlns:p14="http://schemas.microsoft.com/office/powerpoint/2010/main" val="2294389289"/>
+      </p:ext>
+    </p:extLst>
+  </p:cSld>
+  <p:clrMapOvr>
+    <a:masterClrMapping/>
+  </p:clrMapOvr>
+</p:sld>
+</file>
+
 <file path=ppt/slides/slide2.xml><?xml version="1.0" encoding="utf-8"?>
 <p:sld xmlns:a="http://schemas.openxmlformats.org/drawingml/2006/main" xmlns:r="http://schemas.openxmlformats.org/officeDocument/2006/relationships" xmlns:p="http://schemas.openxmlformats.org/presentationml/2006/main">
   <p:cSld>

</xml_diff>

<commit_message>
Field test on german motorway A99 in Munich added
</commit_message>
<xml_diff>
--- a/writeup/Pipeline_test_images/Pipeline.pptx
+++ b/writeup/Pipeline_test_images/Pipeline.pptx
@@ -268,7 +268,7 @@
           <a:p>
             <a:fld id="{E8E9613A-314F-4F57-8FAE-E61648CE5C79}" type="datetimeFigureOut">
               <a:rPr lang="de-DE" smtClean="0"/>
-              <a:t>05.10.2020</a:t>
+              <a:t>06.10.2020</a:t>
             </a:fld>
             <a:endParaRPr lang="de-DE"/>
           </a:p>
@@ -466,7 +466,7 @@
           <a:p>
             <a:fld id="{E8E9613A-314F-4F57-8FAE-E61648CE5C79}" type="datetimeFigureOut">
               <a:rPr lang="de-DE" smtClean="0"/>
-              <a:t>05.10.2020</a:t>
+              <a:t>06.10.2020</a:t>
             </a:fld>
             <a:endParaRPr lang="de-DE"/>
           </a:p>
@@ -674,7 +674,7 @@
           <a:p>
             <a:fld id="{E8E9613A-314F-4F57-8FAE-E61648CE5C79}" type="datetimeFigureOut">
               <a:rPr lang="de-DE" smtClean="0"/>
-              <a:t>05.10.2020</a:t>
+              <a:t>06.10.2020</a:t>
             </a:fld>
             <a:endParaRPr lang="de-DE"/>
           </a:p>
@@ -872,7 +872,7 @@
           <a:p>
             <a:fld id="{E8E9613A-314F-4F57-8FAE-E61648CE5C79}" type="datetimeFigureOut">
               <a:rPr lang="de-DE" smtClean="0"/>
-              <a:t>05.10.2020</a:t>
+              <a:t>06.10.2020</a:t>
             </a:fld>
             <a:endParaRPr lang="de-DE"/>
           </a:p>
@@ -1147,7 +1147,7 @@
           <a:p>
             <a:fld id="{E8E9613A-314F-4F57-8FAE-E61648CE5C79}" type="datetimeFigureOut">
               <a:rPr lang="de-DE" smtClean="0"/>
-              <a:t>05.10.2020</a:t>
+              <a:t>06.10.2020</a:t>
             </a:fld>
             <a:endParaRPr lang="de-DE"/>
           </a:p>
@@ -1412,7 +1412,7 @@
           <a:p>
             <a:fld id="{E8E9613A-314F-4F57-8FAE-E61648CE5C79}" type="datetimeFigureOut">
               <a:rPr lang="de-DE" smtClean="0"/>
-              <a:t>05.10.2020</a:t>
+              <a:t>06.10.2020</a:t>
             </a:fld>
             <a:endParaRPr lang="de-DE"/>
           </a:p>
@@ -1824,7 +1824,7 @@
           <a:p>
             <a:fld id="{E8E9613A-314F-4F57-8FAE-E61648CE5C79}" type="datetimeFigureOut">
               <a:rPr lang="de-DE" smtClean="0"/>
-              <a:t>05.10.2020</a:t>
+              <a:t>06.10.2020</a:t>
             </a:fld>
             <a:endParaRPr lang="de-DE"/>
           </a:p>
@@ -1965,7 +1965,7 @@
           <a:p>
             <a:fld id="{E8E9613A-314F-4F57-8FAE-E61648CE5C79}" type="datetimeFigureOut">
               <a:rPr lang="de-DE" smtClean="0"/>
-              <a:t>05.10.2020</a:t>
+              <a:t>06.10.2020</a:t>
             </a:fld>
             <a:endParaRPr lang="de-DE"/>
           </a:p>
@@ -2078,7 +2078,7 @@
           <a:p>
             <a:fld id="{E8E9613A-314F-4F57-8FAE-E61648CE5C79}" type="datetimeFigureOut">
               <a:rPr lang="de-DE" smtClean="0"/>
-              <a:t>05.10.2020</a:t>
+              <a:t>06.10.2020</a:t>
             </a:fld>
             <a:endParaRPr lang="de-DE"/>
           </a:p>
@@ -2389,7 +2389,7 @@
           <a:p>
             <a:fld id="{E8E9613A-314F-4F57-8FAE-E61648CE5C79}" type="datetimeFigureOut">
               <a:rPr lang="de-DE" smtClean="0"/>
-              <a:t>05.10.2020</a:t>
+              <a:t>06.10.2020</a:t>
             </a:fld>
             <a:endParaRPr lang="de-DE"/>
           </a:p>
@@ -2677,7 +2677,7 @@
           <a:p>
             <a:fld id="{E8E9613A-314F-4F57-8FAE-E61648CE5C79}" type="datetimeFigureOut">
               <a:rPr lang="de-DE" smtClean="0"/>
-              <a:t>05.10.2020</a:t>
+              <a:t>06.10.2020</a:t>
             </a:fld>
             <a:endParaRPr lang="de-DE"/>
           </a:p>
@@ -2918,7 +2918,7 @@
           <a:p>
             <a:fld id="{E8E9613A-314F-4F57-8FAE-E61648CE5C79}" type="datetimeFigureOut">
               <a:rPr lang="de-DE" smtClean="0"/>
-              <a:t>05.10.2020</a:t>
+              <a:t>06.10.2020</a:t>
             </a:fld>
             <a:endParaRPr lang="de-DE"/>
           </a:p>
@@ -8434,6 +8434,291 @@
           </a:p>
         </p:txBody>
       </p:sp>
+      <p:pic>
+        <p:nvPicPr>
+          <p:cNvPr id="16" name="Picture 2">
+            <a:extLst>
+              <a:ext uri="{FF2B5EF4-FFF2-40B4-BE49-F238E27FC236}">
+                <a16:creationId xmlns:a16="http://schemas.microsoft.com/office/drawing/2014/main" id="{F96FDBBA-D968-4101-8AA0-2AE06CCD9E77}"/>
+              </a:ext>
+            </a:extLst>
+          </p:cNvPr>
+          <p:cNvPicPr>
+            <a:picLocks noChangeAspect="1" noChangeArrowheads="1"/>
+          </p:cNvPicPr>
+          <p:nvPr/>
+        </p:nvPicPr>
+        <p:blipFill>
+          <a:blip r:embed="rId6">
+            <a:extLst>
+              <a:ext uri="{28A0092B-C50C-407E-A947-70E740481C1C}">
+                <a14:useLocalDpi xmlns:a14="http://schemas.microsoft.com/office/drawing/2010/main" val="0"/>
+              </a:ext>
+            </a:extLst>
+          </a:blip>
+          <a:srcRect/>
+          <a:stretch>
+            <a:fillRect/>
+          </a:stretch>
+        </p:blipFill>
+        <p:spPr bwMode="auto">
+          <a:xfrm>
+            <a:off x="4426742" y="4291321"/>
+            <a:ext cx="2767014" cy="1645451"/>
+          </a:xfrm>
+          <a:prstGeom prst="rect">
+            <a:avLst/>
+          </a:prstGeom>
+          <a:noFill/>
+          <a:extLst>
+            <a:ext uri="{909E8E84-426E-40DD-AFC4-6F175D3DCCD1}">
+              <a14:hiddenFill xmlns:a14="http://schemas.microsoft.com/office/drawing/2010/main">
+                <a:solidFill>
+                  <a:srgbClr val="FFFFFF"/>
+                </a:solidFill>
+              </a14:hiddenFill>
+            </a:ext>
+          </a:extLst>
+        </p:spPr>
+      </p:pic>
+      <p:cxnSp>
+        <p:nvCxnSpPr>
+          <p:cNvPr id="17" name="Gerade Verbindung mit Pfeil 16">
+            <a:extLst>
+              <a:ext uri="{FF2B5EF4-FFF2-40B4-BE49-F238E27FC236}">
+                <a16:creationId xmlns:a16="http://schemas.microsoft.com/office/drawing/2014/main" id="{A5D95947-53EC-49DE-AF63-AED0F7ACD3F2}"/>
+              </a:ext>
+            </a:extLst>
+          </p:cNvPr>
+          <p:cNvCxnSpPr>
+            <a:cxnSpLocks/>
+          </p:cNvCxnSpPr>
+          <p:nvPr/>
+        </p:nvCxnSpPr>
+        <p:spPr>
+          <a:xfrm flipH="1">
+            <a:off x="7244743" y="5069547"/>
+            <a:ext cx="1580475" cy="0"/>
+          </a:xfrm>
+          <a:prstGeom prst="straightConnector1">
+            <a:avLst/>
+          </a:prstGeom>
+          <a:ln>
+            <a:tailEnd type="triangle"/>
+          </a:ln>
+        </p:spPr>
+        <p:style>
+          <a:lnRef idx="1">
+            <a:schemeClr val="accent1"/>
+          </a:lnRef>
+          <a:fillRef idx="0">
+            <a:schemeClr val="accent1"/>
+          </a:fillRef>
+          <a:effectRef idx="0">
+            <a:schemeClr val="accent1"/>
+          </a:effectRef>
+          <a:fontRef idx="minor">
+            <a:schemeClr val="tx1"/>
+          </a:fontRef>
+        </p:style>
+      </p:cxnSp>
+      <p:sp>
+        <p:nvSpPr>
+          <p:cNvPr id="18" name="Textfeld 17">
+            <a:extLst>
+              <a:ext uri="{FF2B5EF4-FFF2-40B4-BE49-F238E27FC236}">
+                <a16:creationId xmlns:a16="http://schemas.microsoft.com/office/drawing/2014/main" id="{3A7A6D04-1BB6-4808-892C-C5347EDD4D4D}"/>
+              </a:ext>
+            </a:extLst>
+          </p:cNvPr>
+          <p:cNvSpPr txBox="1"/>
+          <p:nvPr/>
+        </p:nvSpPr>
+        <p:spPr>
+          <a:xfrm>
+            <a:off x="7220927" y="4414213"/>
+            <a:ext cx="1735086" cy="600164"/>
+          </a:xfrm>
+          <a:prstGeom prst="rect">
+            <a:avLst/>
+          </a:prstGeom>
+          <a:noFill/>
+        </p:spPr>
+        <p:txBody>
+          <a:bodyPr wrap="square" rtlCol="0">
+            <a:spAutoFit/>
+          </a:bodyPr>
+          <a:lstStyle/>
+          <a:p>
+            <a:pPr algn="ctr"/>
+            <a:r>
+              <a:rPr lang="en-US" sz="1100" dirty="0"/>
+              <a:t>Detect lane pixels and fit a polynomial for each lane line</a:t>
+            </a:r>
+            <a:endParaRPr lang="de-DE" sz="1100" dirty="0"/>
+          </a:p>
+        </p:txBody>
+      </p:sp>
+      <p:pic>
+        <p:nvPicPr>
+          <p:cNvPr id="2050" name="Picture 2">
+            <a:extLst>
+              <a:ext uri="{FF2B5EF4-FFF2-40B4-BE49-F238E27FC236}">
+                <a16:creationId xmlns:a16="http://schemas.microsoft.com/office/drawing/2014/main" id="{86E79ECB-E224-4B92-B0A9-AEC1FE011593}"/>
+              </a:ext>
+            </a:extLst>
+          </p:cNvPr>
+          <p:cNvPicPr>
+            <a:picLocks noChangeAspect="1" noChangeArrowheads="1"/>
+          </p:cNvPicPr>
+          <p:nvPr/>
+        </p:nvPicPr>
+        <p:blipFill>
+          <a:blip r:embed="rId7">
+            <a:extLst>
+              <a:ext uri="{28A0092B-C50C-407E-A947-70E740481C1C}">
+                <a14:useLocalDpi xmlns:a14="http://schemas.microsoft.com/office/drawing/2010/main" val="0"/>
+              </a:ext>
+            </a:extLst>
+          </a:blip>
+          <a:srcRect/>
+          <a:stretch>
+            <a:fillRect/>
+          </a:stretch>
+        </p:blipFill>
+        <p:spPr bwMode="auto">
+          <a:xfrm>
+            <a:off x="195570" y="4291321"/>
+            <a:ext cx="2767014" cy="1645451"/>
+          </a:xfrm>
+          <a:prstGeom prst="rect">
+            <a:avLst/>
+          </a:prstGeom>
+          <a:noFill/>
+          <a:extLst>
+            <a:ext uri="{909E8E84-426E-40DD-AFC4-6F175D3DCCD1}">
+              <a14:hiddenFill xmlns:a14="http://schemas.microsoft.com/office/drawing/2010/main">
+                <a:solidFill>
+                  <a:srgbClr val="FFFFFF"/>
+                </a:solidFill>
+              </a14:hiddenFill>
+            </a:ext>
+          </a:extLst>
+        </p:spPr>
+      </p:pic>
+      <p:sp>
+        <p:nvSpPr>
+          <p:cNvPr id="20" name="Textfeld 19">
+            <a:extLst>
+              <a:ext uri="{FF2B5EF4-FFF2-40B4-BE49-F238E27FC236}">
+                <a16:creationId xmlns:a16="http://schemas.microsoft.com/office/drawing/2014/main" id="{8F593D56-F1DC-42C6-B282-244ACA6E9161}"/>
+              </a:ext>
+            </a:extLst>
+          </p:cNvPr>
+          <p:cNvSpPr txBox="1"/>
+          <p:nvPr/>
+        </p:nvSpPr>
+        <p:spPr>
+          <a:xfrm>
+            <a:off x="2851224" y="4362378"/>
+            <a:ext cx="1735086" cy="614941"/>
+          </a:xfrm>
+          <a:prstGeom prst="rect">
+            <a:avLst/>
+          </a:prstGeom>
+          <a:noFill/>
+        </p:spPr>
+        <p:txBody>
+          <a:bodyPr wrap="square" rtlCol="0">
+            <a:spAutoFit/>
+          </a:bodyPr>
+          <a:lstStyle/>
+          <a:p>
+            <a:pPr algn="ctr"/>
+            <a:r>
+              <a:rPr lang="en-US" sz="1100" dirty="0"/>
+              <a:t>Skip the sliding windows step once you've found the lines / Search from prior</a:t>
+            </a:r>
+            <a:endParaRPr lang="de-DE" sz="1100" dirty="0"/>
+          </a:p>
+        </p:txBody>
+      </p:sp>
+      <p:cxnSp>
+        <p:nvCxnSpPr>
+          <p:cNvPr id="21" name="Gerade Verbindung mit Pfeil 20">
+            <a:extLst>
+              <a:ext uri="{FF2B5EF4-FFF2-40B4-BE49-F238E27FC236}">
+                <a16:creationId xmlns:a16="http://schemas.microsoft.com/office/drawing/2014/main" id="{46DC3EB9-82D1-4E98-85FE-20054BBABC07}"/>
+              </a:ext>
+            </a:extLst>
+          </p:cNvPr>
+          <p:cNvCxnSpPr>
+            <a:cxnSpLocks/>
+          </p:cNvCxnSpPr>
+          <p:nvPr/>
+        </p:nvCxnSpPr>
+        <p:spPr>
+          <a:xfrm flipH="1">
+            <a:off x="3061982" y="5048375"/>
+            <a:ext cx="1447024" cy="0"/>
+          </a:xfrm>
+          <a:prstGeom prst="straightConnector1">
+            <a:avLst/>
+          </a:prstGeom>
+          <a:ln>
+            <a:tailEnd type="triangle"/>
+          </a:ln>
+        </p:spPr>
+        <p:style>
+          <a:lnRef idx="1">
+            <a:schemeClr val="accent1"/>
+          </a:lnRef>
+          <a:fillRef idx="0">
+            <a:schemeClr val="accent1"/>
+          </a:fillRef>
+          <a:effectRef idx="0">
+            <a:schemeClr val="accent1"/>
+          </a:effectRef>
+          <a:fontRef idx="minor">
+            <a:schemeClr val="tx1"/>
+          </a:fontRef>
+        </p:style>
+      </p:cxnSp>
+      <p:sp>
+        <p:nvSpPr>
+          <p:cNvPr id="7" name="Rechteck 6">
+            <a:extLst>
+              <a:ext uri="{FF2B5EF4-FFF2-40B4-BE49-F238E27FC236}">
+                <a16:creationId xmlns:a16="http://schemas.microsoft.com/office/drawing/2014/main" id="{9842A24C-42E1-4F39-9D10-127501FB0739}"/>
+              </a:ext>
+            </a:extLst>
+          </p:cNvPr>
+          <p:cNvSpPr/>
+          <p:nvPr/>
+        </p:nvSpPr>
+        <p:spPr>
+          <a:xfrm>
+            <a:off x="4766362" y="5936772"/>
+            <a:ext cx="2452887" cy="430887"/>
+          </a:xfrm>
+          <a:prstGeom prst="rect">
+            <a:avLst/>
+          </a:prstGeom>
+        </p:spPr>
+        <p:txBody>
+          <a:bodyPr wrap="square">
+            <a:spAutoFit/>
+          </a:bodyPr>
+          <a:lstStyle/>
+          <a:p>
+            <a:r>
+              <a:rPr lang="en-US" sz="1100" dirty="0"/>
+              <a:t>estimated which pixels belong to the left and right lane lines</a:t>
+            </a:r>
+            <a:endParaRPr lang="de-DE" sz="1100" dirty="0"/>
+          </a:p>
+        </p:txBody>
+      </p:sp>
     </p:spTree>
     <p:extLst>
       <p:ext uri="{BB962C8B-B14F-4D97-AF65-F5344CB8AC3E}">

</xml_diff>